<commit_message>
Feito as Correções Solicitadas pela Banca
</commit_message>
<xml_diff>
--- a/Apresentação TCC2 Paulo.pptx
+++ b/Apresentação TCC2 Paulo.pptx
@@ -239,7 +239,7 @@
           <a:p>
             <a:fld id="{9989CECE-F34A-4DE1-9A7F-F1C960912CD7}" type="datetimeFigureOut">
               <a:rPr lang="pt-BR" smtClean="0"/>
-              <a:t>28/11/2016</a:t>
+              <a:t>11/12/2016</a:t>
             </a:fld>
             <a:endParaRPr lang="pt-BR"/>
           </a:p>
@@ -908,7 +908,7 @@
           <a:p>
             <a:fld id="{06D2B188-86D3-414B-BB86-E6D1024CE684}" type="datetimeFigureOut">
               <a:rPr lang="pt-BR" smtClean="0"/>
-              <a:t>28/11/2016</a:t>
+              <a:t>11/12/2016</a:t>
             </a:fld>
             <a:endParaRPr lang="pt-BR"/>
           </a:p>
@@ -1221,7 +1221,7 @@
           <a:p>
             <a:fld id="{06D2B188-86D3-414B-BB86-E6D1024CE684}" type="datetimeFigureOut">
               <a:rPr lang="pt-BR" smtClean="0"/>
-              <a:t>28/11/2016</a:t>
+              <a:t>11/12/2016</a:t>
             </a:fld>
             <a:endParaRPr lang="pt-BR"/>
           </a:p>
@@ -1406,7 +1406,7 @@
           <a:p>
             <a:fld id="{06D2B188-86D3-414B-BB86-E6D1024CE684}" type="datetimeFigureOut">
               <a:rPr lang="pt-BR" smtClean="0"/>
-              <a:t>28/11/2016</a:t>
+              <a:t>11/12/2016</a:t>
             </a:fld>
             <a:endParaRPr lang="pt-BR"/>
           </a:p>
@@ -1581,7 +1581,7 @@
           <a:p>
             <a:fld id="{06D2B188-86D3-414B-BB86-E6D1024CE684}" type="datetimeFigureOut">
               <a:rPr lang="pt-BR" smtClean="0"/>
-              <a:t>28/11/2016</a:t>
+              <a:t>11/12/2016</a:t>
             </a:fld>
             <a:endParaRPr lang="pt-BR"/>
           </a:p>
@@ -1849,7 +1849,7 @@
           <a:p>
             <a:fld id="{06D2B188-86D3-414B-BB86-E6D1024CE684}" type="datetimeFigureOut">
               <a:rPr lang="pt-BR" smtClean="0"/>
-              <a:t>28/11/2016</a:t>
+              <a:t>11/12/2016</a:t>
             </a:fld>
             <a:endParaRPr lang="pt-BR"/>
           </a:p>
@@ -2317,7 +2317,7 @@
           <a:p>
             <a:fld id="{06D2B188-86D3-414B-BB86-E6D1024CE684}" type="datetimeFigureOut">
               <a:rPr lang="pt-BR" smtClean="0"/>
-              <a:t>28/11/2016</a:t>
+              <a:t>11/12/2016</a:t>
             </a:fld>
             <a:endParaRPr lang="pt-BR"/>
           </a:p>
@@ -2806,7 +2806,7 @@
           <a:p>
             <a:fld id="{06D2B188-86D3-414B-BB86-E6D1024CE684}" type="datetimeFigureOut">
               <a:rPr lang="pt-BR" smtClean="0"/>
-              <a:t>28/11/2016</a:t>
+              <a:t>11/12/2016</a:t>
             </a:fld>
             <a:endParaRPr lang="pt-BR"/>
           </a:p>
@@ -2932,7 +2932,7 @@
           <a:p>
             <a:fld id="{06D2B188-86D3-414B-BB86-E6D1024CE684}" type="datetimeFigureOut">
               <a:rPr lang="pt-BR" smtClean="0"/>
-              <a:t>28/11/2016</a:t>
+              <a:t>11/12/2016</a:t>
             </a:fld>
             <a:endParaRPr lang="pt-BR"/>
           </a:p>
@@ -3076,7 +3076,7 @@
           <a:p>
             <a:fld id="{06D2B188-86D3-414B-BB86-E6D1024CE684}" type="datetimeFigureOut">
               <a:rPr lang="pt-BR" smtClean="0"/>
-              <a:t>28/11/2016</a:t>
+              <a:t>11/12/2016</a:t>
             </a:fld>
             <a:endParaRPr lang="pt-BR"/>
           </a:p>
@@ -3398,7 +3398,7 @@
           <a:p>
             <a:fld id="{06D2B188-86D3-414B-BB86-E6D1024CE684}" type="datetimeFigureOut">
               <a:rPr lang="pt-BR" smtClean="0"/>
-              <a:t>28/11/2016</a:t>
+              <a:t>11/12/2016</a:t>
             </a:fld>
             <a:endParaRPr lang="pt-BR"/>
           </a:p>
@@ -3532,7 +3532,7 @@
           <a:p>
             <a:fld id="{06D2B188-86D3-414B-BB86-E6D1024CE684}" type="datetimeFigureOut">
               <a:rPr lang="pt-BR" smtClean="0"/>
-              <a:t>28/11/2016</a:t>
+              <a:t>11/12/2016</a:t>
             </a:fld>
             <a:endParaRPr lang="pt-BR"/>
           </a:p>
@@ -4313,7 +4313,7 @@
           <a:p>
             <a:fld id="{06D2B188-86D3-414B-BB86-E6D1024CE684}" type="datetimeFigureOut">
               <a:rPr lang="pt-BR" smtClean="0"/>
-              <a:t>28/11/2016</a:t>
+              <a:t>11/12/2016</a:t>
             </a:fld>
             <a:endParaRPr lang="pt-BR"/>
           </a:p>
@@ -4866,7 +4866,6 @@
               <a:rPr lang="pt-BR" sz="2000" dirty="0"/>
               <a:t>Acadêmico:</a:t>
             </a:r>
-            <a:endParaRPr lang="pt-BR" sz="2000" dirty="0"/>
           </a:p>
           <a:p>
             <a:r>
@@ -4892,20 +4891,7 @@
                 <a:latin typeface="Segoe UI" panose="020B0502040204020203" pitchFamily="34" charset="0"/>
                 <a:cs typeface="Segoe UI" panose="020B0502040204020203" pitchFamily="34" charset="0"/>
               </a:rPr>
-              <a:t> </a:t>
-            </a:r>
-            <a:r>
-              <a:rPr lang="pt-BR" sz="2000" dirty="0">
-                <a:solidFill>
-                  <a:schemeClr val="tx1">
-                    <a:lumMod val="95000"/>
-                    <a:lumOff val="5000"/>
-                  </a:schemeClr>
-                </a:solidFill>
-                <a:latin typeface="Segoe UI" panose="020B0502040204020203" pitchFamily="34" charset="0"/>
-                <a:cs typeface="Segoe UI" panose="020B0502040204020203" pitchFamily="34" charset="0"/>
-              </a:rPr>
-              <a:t>Vivaldo Pinto </a:t>
+              <a:t> Vivaldo Pinto </a:t>
             </a:r>
             <a:endParaRPr lang="pt-BR" sz="2000" dirty="0"/>
           </a:p>
@@ -4975,8 +4961,8 @@
         </p:blipFill>
         <p:spPr>
           <a:xfrm>
-            <a:off x="0" y="404664"/>
-            <a:ext cx="9144000" cy="6453338"/>
+            <a:off x="0" y="585579"/>
+            <a:ext cx="9144000" cy="6091508"/>
           </a:xfrm>
         </p:spPr>
       </p:pic>
@@ -5209,19 +5195,7 @@
             </a:pPr>
             <a:r>
               <a:rPr lang="pt-BR" dirty="0" smtClean="0"/>
-              <a:t>O novo sistema que será implantado na Gerencia TFD visa dar mais agilidade </a:t>
-            </a:r>
-            <a:r>
-              <a:rPr lang="pt-BR" dirty="0" smtClean="0"/>
-              <a:t>no processo </a:t>
-            </a:r>
-            <a:r>
-              <a:rPr lang="pt-BR" dirty="0" smtClean="0"/>
-              <a:t>envolvido no programa de Tratamento Foro Domicílio, contando com vários benefícios para auxiliar os operadores do programa TFD no atendimento aos </a:t>
-            </a:r>
-            <a:r>
-              <a:rPr lang="pt-BR" dirty="0" smtClean="0"/>
-              <a:t>usuários.</a:t>
+              <a:t>O novo sistema que será implantado na Gerencia TFD visa dar mais agilidade no processo envolvido no programa de Tratamento Foro Domicílio, contando com vários benefícios para auxiliar os operadores do programa TFD no atendimento aos usuários.</a:t>
             </a:r>
             <a:endParaRPr lang="pt-BR" dirty="0"/>
           </a:p>
@@ -5312,7 +5286,11 @@
             <a:pPr algn="ctr"/>
             <a:r>
               <a:rPr lang="pt-BR" sz="3600" dirty="0"/>
-              <a:t>Sistema de Informação de Paciente no Tratamento fora Domiciliar</a:t>
+              <a:t>Sistema de Informação de Paciente no Tratamento fora </a:t>
+            </a:r>
+            <a:r>
+              <a:rPr lang="pt-BR" sz="3600" dirty="0" smtClean="0"/>
+              <a:t>Domicílio</a:t>
             </a:r>
             <a:endParaRPr lang="pt-BR" sz="3600" dirty="0"/>
           </a:p>
@@ -5397,7 +5375,7 @@
         </p:nvSpPr>
         <p:spPr>
           <a:xfrm>
-            <a:off x="1043608" y="1268760"/>
+            <a:off x="1043608" y="1196752"/>
             <a:ext cx="7920880" cy="4536504"/>
           </a:xfrm>
         </p:spPr>
@@ -5420,7 +5398,7 @@
             </a:r>
             <a:r>
               <a:rPr lang="pt-BR" dirty="0" smtClean="0"/>
-              <a:t>, instituído pela Portaria nº 55 da Secretaria de Assistência à Saúde (Ministério da Saúde), é um instrumento legal que visa garantir, através do SUS, tratamento médico a pacientes portadores de doenças não tratáveis no município de origem por falta de condições técnicas.</a:t>
+              <a:t>, instituído pela Portaria nº 55 da Secretaria de Assistência à Saúde (Ministério da Saúde), é um instrumento legal que visa garantir, através do SUS, tratamento médico à pacientes portadores de doenças não tratáveis no município de origem por falta de condições técnicas.</a:t>
             </a:r>
             <a:endParaRPr lang="pt-BR" dirty="0"/>
           </a:p>
@@ -5529,15 +5507,15 @@
             </a:pPr>
             <a:r>
               <a:rPr lang="pt-BR" sz="3200" dirty="0" smtClean="0"/>
-              <a:t>	Isso vem dificultado o trabalho dos operadores da Gerencia TFD no controle dos </a:t>
+              <a:t>	Isso vem dificultado o trabalho dos operadores da </a:t>
             </a:r>
             <a:r>
               <a:rPr lang="pt-BR" sz="3200" dirty="0" smtClean="0"/>
-              <a:t>pacientes </a:t>
+              <a:t>Gerência </a:t>
             </a:r>
             <a:r>
               <a:rPr lang="pt-BR" sz="3200" dirty="0" smtClean="0"/>
-              <a:t>em tratamento.</a:t>
+              <a:t>TFD no controle dos pacientes em tratamento.</a:t>
             </a:r>
             <a:endParaRPr lang="pt-BR" sz="3200" dirty="0"/>
           </a:p>
@@ -5635,39 +5613,23 @@
             </a:pPr>
             <a:r>
               <a:rPr lang="pt-BR" dirty="0" smtClean="0"/>
-              <a:t>	Facilitar o Controle </a:t>
+              <a:t>	Facilitar o Controle de requisições de </a:t>
             </a:r>
             <a:r>
               <a:rPr lang="pt-BR" dirty="0" smtClean="0"/>
-              <a:t>de requisições de viajem para Pacientes </a:t>
+              <a:t>viagem </a:t>
             </a:r>
             <a:r>
               <a:rPr lang="pt-BR" dirty="0" smtClean="0"/>
-              <a:t>que estão no tratamento fora domicílio, dando para os operadores da </a:t>
+              <a:t>para Pacientes que estão no tratamento fora domicílio, dando para os operadores da </a:t>
             </a:r>
             <a:r>
               <a:rPr lang="pt-BR" dirty="0" smtClean="0"/>
-              <a:t>gerencia </a:t>
+              <a:t>gerência </a:t>
             </a:r>
             <a:r>
               <a:rPr lang="pt-BR" dirty="0" smtClean="0"/>
-              <a:t>de tratamento fora </a:t>
-            </a:r>
-            <a:r>
-              <a:rPr lang="pt-BR" dirty="0" smtClean="0"/>
-              <a:t>domiciliar uma visão ampla no </a:t>
-            </a:r>
-            <a:r>
-              <a:rPr lang="pt-BR" dirty="0" smtClean="0"/>
-              <a:t>acompanhamento do paciente envolvido no </a:t>
-            </a:r>
-            <a:r>
-              <a:rPr lang="pt-BR" dirty="0" smtClean="0"/>
-              <a:t>processo de tratamento </a:t>
-            </a:r>
-            <a:r>
-              <a:rPr lang="pt-BR" dirty="0" smtClean="0"/>
-              <a:t>fora domicílio.</a:t>
+              <a:t>de tratamento fora domiciliar uma visão ampla no acompanhamento do paciente envolvido no processo de tratamento fora domicílio.</a:t>
             </a:r>
             <a:endParaRPr lang="pt-BR" dirty="0"/>
           </a:p>
@@ -5860,8 +5822,8 @@
         </p:blipFill>
         <p:spPr>
           <a:xfrm>
-            <a:off x="1043608" y="764704"/>
-            <a:ext cx="7848872" cy="5904656"/>
+            <a:off x="1043608" y="836712"/>
+            <a:ext cx="7848872" cy="5616624"/>
           </a:xfrm>
         </p:spPr>
       </p:pic>
@@ -5928,7 +5890,6 @@
               <a:rPr lang="pt-BR" sz="2800" dirty="0"/>
               <a:t>Diagrama de Sequencia Requisição de Viagem</a:t>
             </a:r>
-            <a:endParaRPr lang="pt-BR" sz="2800" dirty="0"/>
           </a:p>
         </p:txBody>
       </p:sp>
@@ -5956,8 +5917,8 @@
         </p:blipFill>
         <p:spPr>
           <a:xfrm>
-            <a:off x="1043608" y="548680"/>
-            <a:ext cx="7992888" cy="5832648"/>
+            <a:off x="1080642" y="548680"/>
+            <a:ext cx="7739829" cy="5832648"/>
           </a:xfrm>
         </p:spPr>
       </p:pic>
@@ -6024,7 +5985,6 @@
               <a:rPr lang="pt-BR" sz="3200" dirty="0"/>
               <a:t>Diagrama de Classe Conceitual</a:t>
             </a:r>
-            <a:endParaRPr lang="pt-BR" sz="3200" dirty="0"/>
           </a:p>
         </p:txBody>
       </p:sp>
@@ -6052,8 +6012,8 @@
         </p:blipFill>
         <p:spPr>
           <a:xfrm>
-            <a:off x="1043609" y="692697"/>
-            <a:ext cx="7920880" cy="5616347"/>
+            <a:off x="1043609" y="764704"/>
+            <a:ext cx="7920880" cy="5328592"/>
           </a:xfrm>
         </p:spPr>
       </p:pic>

</xml_diff>